<commit_message>
removed intercepts as predictors
</commit_message>
<xml_diff>
--- a/activities/multilayer_perceptron.pptx
+++ b/activities/multilayer_perceptron.pptx
@@ -3786,7 +3786,7 @@
         <p:spPr/>
         <p:txBody>
           <a:bodyPr>
-            <a:normAutofit lnSpcReduction="10000"/>
+            <a:normAutofit/>
           </a:bodyPr>
           <a:lstStyle/>
           <a:p>
@@ -3857,8 +3857,13 @@
             </a:pPr>
             <a:r>
               <a:rPr lang="en-US" sz="2400" dirty="0"/>
-              <a:t>It may be helpful to draw or create graphs for these models. For this activity, bias/intercept parameters may be ignored.</a:t>
+              <a:t>It may be helpful to draw or create graphs for </a:t>
             </a:r>
+            <a:r>
+              <a:rPr lang="en-US" sz="2400"/>
+              <a:t>these models.</a:t>
+            </a:r>
+            <a:endParaRPr lang="en-US" sz="2400" dirty="0"/>
           </a:p>
         </p:txBody>
       </p:sp>
@@ -4075,47 +4080,6 @@
       </p:sp>
       <p:cxnSp>
         <p:nvCxnSpPr>
-          <p:cNvPr id="4" name="Straight Arrow Connector 3">
-            <a:extLst>
-              <a:ext uri="{FF2B5EF4-FFF2-40B4-BE49-F238E27FC236}">
-                <a16:creationId xmlns:a16="http://schemas.microsoft.com/office/drawing/2014/main" id="{BD5F68B1-46AF-CC03-F986-0B3B137C59D1}"/>
-              </a:ext>
-            </a:extLst>
-          </p:cNvPr>
-          <p:cNvCxnSpPr>
-            <a:cxnSpLocks/>
-          </p:cNvCxnSpPr>
-          <p:nvPr/>
-        </p:nvCxnSpPr>
-        <p:spPr>
-          <a:xfrm flipV="1">
-            <a:off x="8638528" y="4750150"/>
-            <a:ext cx="0" cy="577652"/>
-          </a:xfrm>
-          <a:prstGeom prst="straightConnector1">
-            <a:avLst/>
-          </a:prstGeom>
-          <a:ln>
-            <a:tailEnd type="triangle"/>
-          </a:ln>
-        </p:spPr>
-        <p:style>
-          <a:lnRef idx="2">
-            <a:schemeClr val="dk1"/>
-          </a:lnRef>
-          <a:fillRef idx="0">
-            <a:schemeClr val="dk1"/>
-          </a:fillRef>
-          <a:effectRef idx="1">
-            <a:schemeClr val="dk1"/>
-          </a:effectRef>
-          <a:fontRef idx="minor">
-            <a:schemeClr val="tx1"/>
-          </a:fontRef>
-        </p:style>
-      </p:cxnSp>
-      <p:cxnSp>
-        <p:nvCxnSpPr>
           <p:cNvPr id="5" name="Straight Arrow Connector 4">
             <a:extLst>
               <a:ext uri="{FF2B5EF4-FFF2-40B4-BE49-F238E27FC236}">
@@ -4130,8 +4094,8 @@
         </p:nvCxnSpPr>
         <p:spPr>
           <a:xfrm flipV="1">
-            <a:off x="9700334" y="4783478"/>
-            <a:ext cx="0" cy="563050"/>
+            <a:off x="9267188" y="4757195"/>
+            <a:ext cx="235178" cy="613872"/>
           </a:xfrm>
           <a:prstGeom prst="straightConnector1">
             <a:avLst/>
@@ -4169,13 +4133,14 @@
           </p:cNvPr>
           <p:cNvCxnSpPr>
             <a:cxnSpLocks/>
+            <a:stCxn id="11" idx="0"/>
           </p:cNvCxnSpPr>
           <p:nvPr/>
         </p:nvCxnSpPr>
         <p:spPr>
           <a:xfrm flipH="1" flipV="1">
-            <a:off x="8971953" y="4750150"/>
-            <a:ext cx="342805" cy="565913"/>
+            <a:off x="8817744" y="4767432"/>
+            <a:ext cx="334207" cy="603635"/>
           </a:xfrm>
           <a:prstGeom prst="straightConnector1">
             <a:avLst/>
@@ -4529,8 +4494,8 @@
           </p:sp>
         </mc:Fallback>
       </mc:AlternateContent>
-      <mc:AlternateContent xmlns:mc="http://schemas.openxmlformats.org/markup-compatibility/2006" xmlns:a14="http://schemas.microsoft.com/office/drawing/2010/main">
-        <mc:Choice Requires="a14">
+      <mc:AlternateContent xmlns:mc="http://schemas.openxmlformats.org/markup-compatibility/2006">
+        <mc:Choice xmlns:a14="http://schemas.microsoft.com/office/drawing/2010/main" Requires="a14">
           <p:graphicFrame>
             <p:nvGraphicFramePr>
               <p:cNvPr id="11" name="Table 10">
@@ -4546,14 +4511,14 @@
               <p:nvPr>
                 <p:extLst>
                   <p:ext uri="{D42A27DB-BD31-4B8C-83A1-F6EECF244321}">
-                    <p14:modId xmlns:p14="http://schemas.microsoft.com/office/powerpoint/2010/main" val="1389189262"/>
+                    <p14:modId xmlns:p14="http://schemas.microsoft.com/office/powerpoint/2010/main" val="2085883720"/>
                   </p:ext>
                 </p:extLst>
               </p:nvPr>
             </p:nvGraphicFramePr>
             <p:xfrm>
-              <a:off x="8420718" y="5380038"/>
-              <a:ext cx="1446062" cy="707853"/>
+              <a:off x="8790436" y="5371067"/>
+              <a:ext cx="723031" cy="707853"/>
             </p:xfrm>
             <a:graphic>
               <a:graphicData uri="http://schemas.openxmlformats.org/drawingml/2006/table">
@@ -4565,90 +4530,12 @@
                     <a:gridCol w="723031">
                       <a:extLst>
                         <a:ext uri="{9D8B030D-6E8A-4147-A177-3AD203B41FA5}">
-                          <a16:colId xmlns:a16="http://schemas.microsoft.com/office/drawing/2014/main" val="4002730172"/>
-                        </a:ext>
-                      </a:extLst>
-                    </a:gridCol>
-                    <a:gridCol w="723031">
-                      <a:extLst>
-                        <a:ext uri="{9D8B030D-6E8A-4147-A177-3AD203B41FA5}">
                           <a16:colId xmlns:a16="http://schemas.microsoft.com/office/drawing/2014/main" val="440623976"/>
                         </a:ext>
                       </a:extLst>
                     </a:gridCol>
                   </a:tblGrid>
                   <a:tr h="707853">
-                    <a:tc>
-                      <a:txBody>
-                        <a:bodyPr/>
-                        <a:lstStyle/>
-                        <a:p>
-                          <a:pPr algn="ctr"/>
-                          <a14:m>
-                            <m:oMathPara xmlns:m="http://schemas.openxmlformats.org/officeDocument/2006/math">
-                              <m:oMathParaPr>
-                                <m:jc m:val="centerGroup"/>
-                              </m:oMathParaPr>
-                              <m:oMath xmlns:m="http://schemas.openxmlformats.org/officeDocument/2006/math">
-                                <m:r>
-                                  <a:rPr lang="en-US" sz="2400" b="0" i="0" dirty="0" smtClean="0">
-                                    <a:solidFill>
-                                      <a:schemeClr val="tx1"/>
-                                    </a:solidFill>
-                                    <a:latin typeface="Cambria Math" panose="02040503050406030204" pitchFamily="18" charset="0"/>
-                                  </a:rPr>
-                                  <m:t>1</m:t>
-                                </m:r>
-                              </m:oMath>
-                            </m:oMathPara>
-                          </a14:m>
-                          <a:endParaRPr lang="en-US" sz="2400" b="0" i="0" dirty="0">
-                            <a:solidFill>
-                              <a:schemeClr val="tx1"/>
-                            </a:solidFill>
-                          </a:endParaRPr>
-                        </a:p>
-                      </a:txBody>
-                      <a:tcPr anchor="ctr">
-                        <a:lnL w="38100" cap="flat" cmpd="sng" algn="ctr">
-                          <a:solidFill>
-                            <a:schemeClr val="tx1"/>
-                          </a:solidFill>
-                          <a:prstDash val="solid"/>
-                          <a:round/>
-                          <a:headEnd type="none" w="med" len="med"/>
-                          <a:tailEnd type="none" w="med" len="med"/>
-                        </a:lnL>
-                        <a:lnR w="38100" cap="flat" cmpd="sng" algn="ctr">
-                          <a:solidFill>
-                            <a:schemeClr val="tx1"/>
-                          </a:solidFill>
-                          <a:prstDash val="solid"/>
-                          <a:round/>
-                          <a:headEnd type="none" w="med" len="med"/>
-                          <a:tailEnd type="none" w="med" len="med"/>
-                        </a:lnR>
-                        <a:lnT w="38100" cap="flat" cmpd="sng" algn="ctr">
-                          <a:solidFill>
-                            <a:schemeClr val="tx1"/>
-                          </a:solidFill>
-                          <a:prstDash val="solid"/>
-                          <a:round/>
-                          <a:headEnd type="none" w="med" len="med"/>
-                          <a:tailEnd type="none" w="med" len="med"/>
-                        </a:lnT>
-                        <a:lnB w="38100" cap="flat" cmpd="sng" algn="ctr">
-                          <a:solidFill>
-                            <a:schemeClr val="tx1"/>
-                          </a:solidFill>
-                          <a:prstDash val="solid"/>
-                          <a:round/>
-                          <a:headEnd type="none" w="med" len="med"/>
-                          <a:tailEnd type="none" w="med" len="med"/>
-                        </a:lnB>
-                        <a:noFill/>
-                      </a:tcPr>
-                    </a:tc>
                     <a:tc>
                       <a:txBody>
                         <a:bodyPr/>
@@ -4756,7 +4643,7 @@
             </a:graphic>
           </p:graphicFrame>
         </mc:Choice>
-        <mc:Fallback xmlns="">
+        <mc:Fallback>
           <p:graphicFrame>
             <p:nvGraphicFramePr>
               <p:cNvPr id="11" name="Table 10">
@@ -4772,14 +4659,14 @@
               <p:nvPr>
                 <p:extLst>
                   <p:ext uri="{D42A27DB-BD31-4B8C-83A1-F6EECF244321}">
-                    <p14:modId xmlns:p14="http://schemas.microsoft.com/office/powerpoint/2010/main" val="1389189262"/>
+                    <p14:modId xmlns:p14="http://schemas.microsoft.com/office/powerpoint/2010/main" val="2085883720"/>
                   </p:ext>
                 </p:extLst>
               </p:nvPr>
             </p:nvGraphicFramePr>
             <p:xfrm>
-              <a:off x="8420718" y="5380038"/>
-              <a:ext cx="1446062" cy="707853"/>
+              <a:off x="8790436" y="5371067"/>
+              <a:ext cx="723031" cy="707853"/>
             </p:xfrm>
             <a:graphic>
               <a:graphicData uri="http://schemas.openxmlformats.org/drawingml/2006/table">
@@ -4788,13 +4675,6 @@
                     <a:tableStyleId>{5C22544A-7EE6-4342-B048-85BDC9FD1C3A}</a:tableStyleId>
                   </a:tblPr>
                   <a:tblGrid>
-                    <a:gridCol w="723031">
-                      <a:extLst>
-                        <a:ext uri="{9D8B030D-6E8A-4147-A177-3AD203B41FA5}">
-                          <a16:colId xmlns:a16="http://schemas.microsoft.com/office/drawing/2014/main" val="4002730172"/>
-                        </a:ext>
-                      </a:extLst>
-                    </a:gridCol>
                     <a:gridCol w="723031">
                       <a:extLst>
                         <a:ext uri="{9D8B030D-6E8A-4147-A177-3AD203B41FA5}">
@@ -4852,60 +4732,7 @@
                         <a:blipFill>
                           <a:blip r:embed="rId4"/>
                           <a:stretch>
-                            <a:fillRect l="-3509" t="-3509" r="-105263" b="-5263"/>
-                          </a:stretch>
-                        </a:blipFill>
-                      </a:tcPr>
-                    </a:tc>
-                    <a:tc>
-                      <a:txBody>
-                        <a:bodyPr/>
-                        <a:lstStyle/>
-                        <a:p>
-                          <a:endParaRPr lang="en-US"/>
-                        </a:p>
-                      </a:txBody>
-                      <a:tcPr anchor="ctr">
-                        <a:lnL w="38100" cap="flat" cmpd="sng" algn="ctr">
-                          <a:solidFill>
-                            <a:schemeClr val="tx1"/>
-                          </a:solidFill>
-                          <a:prstDash val="solid"/>
-                          <a:round/>
-                          <a:headEnd type="none" w="med" len="med"/>
-                          <a:tailEnd type="none" w="med" len="med"/>
-                        </a:lnL>
-                        <a:lnR w="38100" cap="flat" cmpd="sng" algn="ctr">
-                          <a:solidFill>
-                            <a:schemeClr val="tx1"/>
-                          </a:solidFill>
-                          <a:prstDash val="solid"/>
-                          <a:round/>
-                          <a:headEnd type="none" w="med" len="med"/>
-                          <a:tailEnd type="none" w="med" len="med"/>
-                        </a:lnR>
-                        <a:lnT w="38100" cap="flat" cmpd="sng" algn="ctr">
-                          <a:solidFill>
-                            <a:schemeClr val="tx1"/>
-                          </a:solidFill>
-                          <a:prstDash val="solid"/>
-                          <a:round/>
-                          <a:headEnd type="none" w="med" len="med"/>
-                          <a:tailEnd type="none" w="med" len="med"/>
-                        </a:lnT>
-                        <a:lnB w="38100" cap="flat" cmpd="sng" algn="ctr">
-                          <a:solidFill>
-                            <a:schemeClr val="tx1"/>
-                          </a:solidFill>
-                          <a:prstDash val="solid"/>
-                          <a:round/>
-                          <a:headEnd type="none" w="med" len="med"/>
-                          <a:tailEnd type="none" w="med" len="med"/>
-                        </a:lnB>
-                        <a:blipFill>
-                          <a:blip r:embed="rId4"/>
-                          <a:stretch>
-                            <a:fillRect l="-103509" t="-3509" r="-5263" b="-5263"/>
+                            <a:fillRect l="-3448" t="-3509" r="-5172" b="-5263"/>
                           </a:stretch>
                         </a:blipFill>
                       </a:tcPr>
@@ -4936,7 +4763,7 @@
         </p:nvSpPr>
         <p:spPr>
           <a:xfrm rot="18054908">
-            <a:off x="8827432" y="6459484"/>
+            <a:off x="8407488" y="6460340"/>
             <a:ext cx="1090081" cy="307777"/>
           </a:xfrm>
           <a:prstGeom prst="rect">
@@ -4954,42 +4781,6 @@
             <a:r>
               <a:rPr lang="en-US" sz="1400" dirty="0"/>
               <a:t>SBP</a:t>
-            </a:r>
-          </a:p>
-        </p:txBody>
-      </p:sp>
-      <p:sp>
-        <p:nvSpPr>
-          <p:cNvPr id="14" name="TextBox 13">
-            <a:extLst>
-              <a:ext uri="{FF2B5EF4-FFF2-40B4-BE49-F238E27FC236}">
-                <a16:creationId xmlns:a16="http://schemas.microsoft.com/office/drawing/2014/main" id="{CBF4A3F7-1B83-B7D3-D88C-FF9965F38B5C}"/>
-              </a:ext>
-            </a:extLst>
-          </p:cNvPr>
-          <p:cNvSpPr txBox="1"/>
-          <p:nvPr/>
-        </p:nvSpPr>
-        <p:spPr>
-          <a:xfrm rot="18054908">
-            <a:off x="7980173" y="6470077"/>
-            <a:ext cx="1204786" cy="307777"/>
-          </a:xfrm>
-          <a:prstGeom prst="rect">
-            <a:avLst/>
-          </a:prstGeom>
-          <a:noFill/>
-        </p:spPr>
-        <p:txBody>
-          <a:bodyPr wrap="square" rtlCol="0">
-            <a:spAutoFit/>
-          </a:bodyPr>
-          <a:lstStyle/>
-          <a:p>
-            <a:pPr algn="r"/>
-            <a:r>
-              <a:rPr lang="en-US" sz="1400" dirty="0"/>
-              <a:t>Intercept</a:t>
             </a:r>
           </a:p>
         </p:txBody>
@@ -5440,47 +5231,6 @@
           <a:xfrm flipV="1">
             <a:off x="9502367" y="3299385"/>
             <a:ext cx="0" cy="177401"/>
-          </a:xfrm>
-          <a:prstGeom prst="straightConnector1">
-            <a:avLst/>
-          </a:prstGeom>
-          <a:ln>
-            <a:tailEnd type="triangle"/>
-          </a:ln>
-        </p:spPr>
-        <p:style>
-          <a:lnRef idx="2">
-            <a:schemeClr val="dk1"/>
-          </a:lnRef>
-          <a:fillRef idx="0">
-            <a:schemeClr val="dk1"/>
-          </a:fillRef>
-          <a:effectRef idx="1">
-            <a:schemeClr val="dk1"/>
-          </a:effectRef>
-          <a:fontRef idx="minor">
-            <a:schemeClr val="tx1"/>
-          </a:fontRef>
-        </p:style>
-      </p:cxnSp>
-      <p:cxnSp>
-        <p:nvCxnSpPr>
-          <p:cNvPr id="23" name="Straight Arrow Connector 22">
-            <a:extLst>
-              <a:ext uri="{FF2B5EF4-FFF2-40B4-BE49-F238E27FC236}">
-                <a16:creationId xmlns:a16="http://schemas.microsoft.com/office/drawing/2014/main" id="{A76397B2-1C3B-09C2-B0D2-58544F8697C0}"/>
-              </a:ext>
-            </a:extLst>
-          </p:cNvPr>
-          <p:cNvCxnSpPr>
-            <a:cxnSpLocks/>
-          </p:cNvCxnSpPr>
-          <p:nvPr/>
-        </p:nvCxnSpPr>
-        <p:spPr>
-          <a:xfrm flipV="1">
-            <a:off x="8886243" y="4740414"/>
-            <a:ext cx="478336" cy="587388"/>
           </a:xfrm>
           <a:prstGeom prst="straightConnector1">
             <a:avLst/>
@@ -6724,8 +6474,8 @@
           </p:sp>
         </mc:Fallback>
       </mc:AlternateContent>
-      <mc:AlternateContent xmlns:mc="http://schemas.openxmlformats.org/markup-compatibility/2006" xmlns:a14="http://schemas.microsoft.com/office/drawing/2010/main">
-        <mc:Choice Requires="a14">
+      <mc:AlternateContent xmlns:mc="http://schemas.openxmlformats.org/markup-compatibility/2006">
+        <mc:Choice xmlns:a14="http://schemas.microsoft.com/office/drawing/2010/main" Requires="a14">
           <p:sp>
             <p:nvSpPr>
               <p:cNvPr id="35" name="TextBox 34">
@@ -6740,7 +6490,7 @@
             </p:nvSpPr>
             <p:spPr>
               <a:xfrm>
-                <a:off x="9700334" y="4881850"/>
+                <a:off x="9364579" y="4881130"/>
                 <a:ext cx="482826" cy="381515"/>
               </a:xfrm>
               <a:prstGeom prst="rect">
@@ -6812,7 +6562,7 @@
             </p:txBody>
           </p:sp>
         </mc:Choice>
-        <mc:Fallback xmlns="">
+        <mc:Fallback>
           <p:sp>
             <p:nvSpPr>
               <p:cNvPr id="35" name="TextBox 34">
@@ -6829,7 +6579,7 @@
             </p:nvSpPr>
             <p:spPr>
               <a:xfrm>
-                <a:off x="9700334" y="4881850"/>
+                <a:off x="9364579" y="4881130"/>
                 <a:ext cx="482826" cy="381515"/>
               </a:xfrm>
               <a:prstGeom prst="rect">
@@ -6838,7 +6588,7 @@
               <a:blipFill>
                 <a:blip r:embed="rId13"/>
                 <a:stretch>
-                  <a:fillRect r="-2564"/>
+                  <a:fillRect/>
                 </a:stretch>
               </a:blipFill>
             </p:spPr>
@@ -6857,8 +6607,8 @@
           </p:sp>
         </mc:Fallback>
       </mc:AlternateContent>
-      <mc:AlternateContent xmlns:mc="http://schemas.openxmlformats.org/markup-compatibility/2006" xmlns:a14="http://schemas.microsoft.com/office/drawing/2010/main">
-        <mc:Choice Requires="a14">
+      <mc:AlternateContent xmlns:mc="http://schemas.openxmlformats.org/markup-compatibility/2006">
+        <mc:Choice xmlns:a14="http://schemas.microsoft.com/office/drawing/2010/main" Requires="a14">
           <p:sp>
             <p:nvSpPr>
               <p:cNvPr id="36" name="TextBox 35">
@@ -6873,7 +6623,7 @@
             </p:nvSpPr>
             <p:spPr>
               <a:xfrm>
-                <a:off x="9184575" y="4878473"/>
+                <a:off x="8538490" y="4902645"/>
                 <a:ext cx="482826" cy="381515"/>
               </a:xfrm>
               <a:prstGeom prst="rect">
@@ -6945,7 +6695,7 @@
             </p:txBody>
           </p:sp>
         </mc:Choice>
-        <mc:Fallback xmlns="">
+        <mc:Fallback>
           <p:sp>
             <p:nvSpPr>
               <p:cNvPr id="36" name="TextBox 35">
@@ -6962,7 +6712,7 @@
             </p:nvSpPr>
             <p:spPr>
               <a:xfrm>
-                <a:off x="9184575" y="4878473"/>
+                <a:off x="8538490" y="4902645"/>
                 <a:ext cx="482826" cy="381515"/>
               </a:xfrm>
               <a:prstGeom prst="rect">
@@ -7463,47 +7213,6 @@
       </p:sp>
       <p:cxnSp>
         <p:nvCxnSpPr>
-          <p:cNvPr id="4" name="Straight Arrow Connector 3">
-            <a:extLst>
-              <a:ext uri="{FF2B5EF4-FFF2-40B4-BE49-F238E27FC236}">
-                <a16:creationId xmlns:a16="http://schemas.microsoft.com/office/drawing/2014/main" id="{BD5F68B1-46AF-CC03-F986-0B3B137C59D1}"/>
-              </a:ext>
-            </a:extLst>
-          </p:cNvPr>
-          <p:cNvCxnSpPr>
-            <a:cxnSpLocks/>
-          </p:cNvCxnSpPr>
-          <p:nvPr/>
-        </p:nvCxnSpPr>
-        <p:spPr>
-          <a:xfrm flipV="1">
-            <a:off x="8307610" y="4750150"/>
-            <a:ext cx="330918" cy="596378"/>
-          </a:xfrm>
-          <a:prstGeom prst="straightConnector1">
-            <a:avLst/>
-          </a:prstGeom>
-          <a:ln>
-            <a:tailEnd type="triangle"/>
-          </a:ln>
-        </p:spPr>
-        <p:style>
-          <a:lnRef idx="2">
-            <a:schemeClr val="dk1"/>
-          </a:lnRef>
-          <a:fillRef idx="0">
-            <a:schemeClr val="dk1"/>
-          </a:fillRef>
-          <a:effectRef idx="1">
-            <a:schemeClr val="dk1"/>
-          </a:effectRef>
-          <a:fontRef idx="minor">
-            <a:schemeClr val="tx1"/>
-          </a:fontRef>
-        </p:style>
-      </p:cxnSp>
-      <p:cxnSp>
-        <p:nvCxnSpPr>
           <p:cNvPr id="5" name="Straight Arrow Connector 4">
             <a:extLst>
               <a:ext uri="{FF2B5EF4-FFF2-40B4-BE49-F238E27FC236}">
@@ -7517,9 +7226,9 @@
           <p:nvPr/>
         </p:nvCxnSpPr>
         <p:spPr>
-          <a:xfrm flipH="1" flipV="1">
-            <a:off x="9700334" y="4783478"/>
-            <a:ext cx="241413" cy="563050"/>
+          <a:xfrm flipV="1">
+            <a:off x="9750265" y="4757195"/>
+            <a:ext cx="0" cy="631187"/>
           </a:xfrm>
           <a:prstGeom prst="straightConnector1">
             <a:avLst/>
@@ -7562,8 +7271,8 @@
         </p:nvCxnSpPr>
         <p:spPr>
           <a:xfrm flipH="1" flipV="1">
-            <a:off x="8971953" y="4750150"/>
-            <a:ext cx="740019" cy="546509"/>
+            <a:off x="8788722" y="4781780"/>
+            <a:ext cx="857694" cy="573245"/>
           </a:xfrm>
           <a:prstGeom prst="straightConnector1">
             <a:avLst/>
@@ -7917,8 +7626,8 @@
           </p:sp>
         </mc:Fallback>
       </mc:AlternateContent>
-      <mc:AlternateContent xmlns:mc="http://schemas.openxmlformats.org/markup-compatibility/2006" xmlns:a14="http://schemas.microsoft.com/office/drawing/2010/main">
-        <mc:Choice Requires="a14">
+      <mc:AlternateContent xmlns:mc="http://schemas.openxmlformats.org/markup-compatibility/2006">
+        <mc:Choice xmlns:a14="http://schemas.microsoft.com/office/drawing/2010/main" Requires="a14">
           <p:graphicFrame>
             <p:nvGraphicFramePr>
               <p:cNvPr id="11" name="Table 10">
@@ -7934,14 +7643,14 @@
               <p:nvPr>
                 <p:extLst>
                   <p:ext uri="{D42A27DB-BD31-4B8C-83A1-F6EECF244321}">
-                    <p14:modId xmlns:p14="http://schemas.microsoft.com/office/powerpoint/2010/main" val="1752504774"/>
+                    <p14:modId xmlns:p14="http://schemas.microsoft.com/office/powerpoint/2010/main" val="2302830241"/>
                   </p:ext>
                 </p:extLst>
               </p:nvPr>
             </p:nvGraphicFramePr>
             <p:xfrm>
-              <a:off x="8100882" y="5356457"/>
-              <a:ext cx="2124558" cy="707853"/>
+              <a:off x="8435563" y="5369487"/>
+              <a:ext cx="1416372" cy="707853"/>
             </p:xfrm>
             <a:graphic>
               <a:graphicData uri="http://schemas.openxmlformats.org/drawingml/2006/table">
@@ -7950,13 +7659,6 @@
                     <a:tableStyleId>{5C22544A-7EE6-4342-B048-85BDC9FD1C3A}</a:tableStyleId>
                   </a:tblPr>
                   <a:tblGrid>
-                    <a:gridCol w="708186">
-                      <a:extLst>
-                        <a:ext uri="{9D8B030D-6E8A-4147-A177-3AD203B41FA5}">
-                          <a16:colId xmlns:a16="http://schemas.microsoft.com/office/drawing/2014/main" val="4002730172"/>
-                        </a:ext>
-                      </a:extLst>
-                    </a:gridCol>
                     <a:gridCol w="708186">
                       <a:extLst>
                         <a:ext uri="{9D8B030D-6E8A-4147-A177-3AD203B41FA5}">
@@ -7973,77 +7675,6 @@
                     </a:gridCol>
                   </a:tblGrid>
                   <a:tr h="707853">
-                    <a:tc>
-                      <a:txBody>
-                        <a:bodyPr/>
-                        <a:lstStyle/>
-                        <a:p>
-                          <a:pPr algn="ctr"/>
-                          <a14:m>
-                            <m:oMathPara xmlns:m="http://schemas.openxmlformats.org/officeDocument/2006/math">
-                              <m:oMathParaPr>
-                                <m:jc m:val="centerGroup"/>
-                              </m:oMathParaPr>
-                              <m:oMath xmlns:m="http://schemas.openxmlformats.org/officeDocument/2006/math">
-                                <m:r>
-                                  <a:rPr lang="en-US" sz="2400" b="0" i="0" dirty="0" smtClean="0">
-                                    <a:solidFill>
-                                      <a:schemeClr val="tx1"/>
-                                    </a:solidFill>
-                                    <a:latin typeface="Cambria Math" panose="02040503050406030204" pitchFamily="18" charset="0"/>
-                                  </a:rPr>
-                                  <m:t>1</m:t>
-                                </m:r>
-                              </m:oMath>
-                            </m:oMathPara>
-                          </a14:m>
-                          <a:endParaRPr lang="en-US" sz="2400" b="0" i="0" dirty="0">
-                            <a:solidFill>
-                              <a:schemeClr val="tx1"/>
-                            </a:solidFill>
-                          </a:endParaRPr>
-                        </a:p>
-                      </a:txBody>
-                      <a:tcPr anchor="ctr">
-                        <a:lnL w="38100" cap="flat" cmpd="sng" algn="ctr">
-                          <a:solidFill>
-                            <a:schemeClr val="tx1"/>
-                          </a:solidFill>
-                          <a:prstDash val="solid"/>
-                          <a:round/>
-                          <a:headEnd type="none" w="med" len="med"/>
-                          <a:tailEnd type="none" w="med" len="med"/>
-                        </a:lnL>
-                        <a:lnR w="38100" cap="flat" cmpd="sng" algn="ctr">
-                          <a:solidFill>
-                            <a:schemeClr val="tx1"/>
-                          </a:solidFill>
-                          <a:prstDash val="solid"/>
-                          <a:round/>
-                          <a:headEnd type="none" w="med" len="med"/>
-                          <a:tailEnd type="none" w="med" len="med"/>
-                        </a:lnR>
-                        <a:lnT w="38100" cap="flat" cmpd="sng" algn="ctr">
-                          <a:solidFill>
-                            <a:schemeClr val="tx1"/>
-                          </a:solidFill>
-                          <a:prstDash val="solid"/>
-                          <a:round/>
-                          <a:headEnd type="none" w="med" len="med"/>
-                          <a:tailEnd type="none" w="med" len="med"/>
-                        </a:lnT>
-                        <a:lnB w="38100" cap="flat" cmpd="sng" algn="ctr">
-                          <a:solidFill>
-                            <a:schemeClr val="tx1"/>
-                          </a:solidFill>
-                          <a:prstDash val="solid"/>
-                          <a:round/>
-                          <a:headEnd type="none" w="med" len="med"/>
-                          <a:tailEnd type="none" w="med" len="med"/>
-                        </a:lnB>
-                        <a:noFill/>
-                      </a:tcPr>
-                    </a:tc>
                     <a:tc>
                       <a:txBody>
                         <a:bodyPr/>
@@ -8247,7 +7878,7 @@
             </a:graphic>
           </p:graphicFrame>
         </mc:Choice>
-        <mc:Fallback xmlns="">
+        <mc:Fallback>
           <p:graphicFrame>
             <p:nvGraphicFramePr>
               <p:cNvPr id="11" name="Table 10">
@@ -8263,14 +7894,14 @@
               <p:nvPr>
                 <p:extLst>
                   <p:ext uri="{D42A27DB-BD31-4B8C-83A1-F6EECF244321}">
-                    <p14:modId xmlns:p14="http://schemas.microsoft.com/office/powerpoint/2010/main" val="1752504774"/>
+                    <p14:modId xmlns:p14="http://schemas.microsoft.com/office/powerpoint/2010/main" val="2302830241"/>
                   </p:ext>
                 </p:extLst>
               </p:nvPr>
             </p:nvGraphicFramePr>
             <p:xfrm>
-              <a:off x="8100882" y="5356457"/>
-              <a:ext cx="2124558" cy="707853"/>
+              <a:off x="8435563" y="5369487"/>
+              <a:ext cx="1416372" cy="707853"/>
             </p:xfrm>
             <a:graphic>
               <a:graphicData uri="http://schemas.openxmlformats.org/drawingml/2006/table">
@@ -8279,13 +7910,6 @@
                     <a:tableStyleId>{5C22544A-7EE6-4342-B048-85BDC9FD1C3A}</a:tableStyleId>
                   </a:tblPr>
                   <a:tblGrid>
-                    <a:gridCol w="708186">
-                      <a:extLst>
-                        <a:ext uri="{9D8B030D-6E8A-4147-A177-3AD203B41FA5}">
-                          <a16:colId xmlns:a16="http://schemas.microsoft.com/office/drawing/2014/main" val="4002730172"/>
-                        </a:ext>
-                      </a:extLst>
-                    </a:gridCol>
                     <a:gridCol w="708186">
                       <a:extLst>
                         <a:ext uri="{9D8B030D-6E8A-4147-A177-3AD203B41FA5}">
@@ -8350,7 +7974,7 @@
                         <a:blipFill>
                           <a:blip r:embed="rId4"/>
                           <a:stretch>
-                            <a:fillRect l="-1786" t="-1754" r="-207143" b="-5263"/>
+                            <a:fillRect l="-3571" t="-3509" r="-107143" b="-5263"/>
                           </a:stretch>
                         </a:blipFill>
                       </a:tcPr>
@@ -8403,60 +8027,7 @@
                         <a:blipFill>
                           <a:blip r:embed="rId4"/>
                           <a:stretch>
-                            <a:fillRect l="-100000" t="-1754" r="-103509" b="-5263"/>
-                          </a:stretch>
-                        </a:blipFill>
-                      </a:tcPr>
-                    </a:tc>
-                    <a:tc>
-                      <a:txBody>
-                        <a:bodyPr/>
-                        <a:lstStyle/>
-                        <a:p>
-                          <a:endParaRPr lang="en-US"/>
-                        </a:p>
-                      </a:txBody>
-                      <a:tcPr anchor="ctr">
-                        <a:lnL w="38100" cap="flat" cmpd="sng" algn="ctr">
-                          <a:solidFill>
-                            <a:schemeClr val="tx1"/>
-                          </a:solidFill>
-                          <a:prstDash val="solid"/>
-                          <a:round/>
-                          <a:headEnd type="none" w="med" len="med"/>
-                          <a:tailEnd type="none" w="med" len="med"/>
-                        </a:lnL>
-                        <a:lnR w="38100" cap="flat" cmpd="sng" algn="ctr">
-                          <a:solidFill>
-                            <a:schemeClr val="tx1"/>
-                          </a:solidFill>
-                          <a:prstDash val="solid"/>
-                          <a:round/>
-                          <a:headEnd type="none" w="med" len="med"/>
-                          <a:tailEnd type="none" w="med" len="med"/>
-                        </a:lnR>
-                        <a:lnT w="38100" cap="flat" cmpd="sng" algn="ctr">
-                          <a:solidFill>
-                            <a:schemeClr val="tx1"/>
-                          </a:solidFill>
-                          <a:prstDash val="solid"/>
-                          <a:round/>
-                          <a:headEnd type="none" w="med" len="med"/>
-                          <a:tailEnd type="none" w="med" len="med"/>
-                        </a:lnT>
-                        <a:lnB w="38100" cap="flat" cmpd="sng" algn="ctr">
-                          <a:solidFill>
-                            <a:schemeClr val="tx1"/>
-                          </a:solidFill>
-                          <a:prstDash val="solid"/>
-                          <a:round/>
-                          <a:headEnd type="none" w="med" len="med"/>
-                          <a:tailEnd type="none" w="med" len="med"/>
-                        </a:lnB>
-                        <a:blipFill>
-                          <a:blip r:embed="rId4"/>
-                          <a:stretch>
-                            <a:fillRect l="-203571" t="-1754" r="-5357" b="-5263"/>
+                            <a:fillRect l="-103571" t="-3509" r="-7143" b="-5263"/>
                           </a:stretch>
                         </a:blipFill>
                       </a:tcPr>
@@ -8487,7 +8058,7 @@
         </p:nvSpPr>
         <p:spPr>
           <a:xfrm rot="18054908">
-            <a:off x="9082265" y="6452217"/>
+            <a:off x="8722146" y="6453211"/>
             <a:ext cx="1090081" cy="307777"/>
           </a:xfrm>
           <a:prstGeom prst="rect">
@@ -8505,42 +8076,6 @@
             <a:r>
               <a:rPr lang="en-US" sz="1400" dirty="0"/>
               <a:t>Sex</a:t>
-            </a:r>
-          </a:p>
-        </p:txBody>
-      </p:sp>
-      <p:sp>
-        <p:nvSpPr>
-          <p:cNvPr id="14" name="TextBox 13">
-            <a:extLst>
-              <a:ext uri="{FF2B5EF4-FFF2-40B4-BE49-F238E27FC236}">
-                <a16:creationId xmlns:a16="http://schemas.microsoft.com/office/drawing/2014/main" id="{CBF4A3F7-1B83-B7D3-D88C-FF9965F38B5C}"/>
-              </a:ext>
-            </a:extLst>
-          </p:cNvPr>
-          <p:cNvSpPr txBox="1"/>
-          <p:nvPr/>
-        </p:nvSpPr>
-        <p:spPr>
-          <a:xfrm rot="18054908">
-            <a:off x="7594619" y="6459483"/>
-            <a:ext cx="1204786" cy="307777"/>
-          </a:xfrm>
-          <a:prstGeom prst="rect">
-            <a:avLst/>
-          </a:prstGeom>
-          <a:noFill/>
-        </p:spPr>
-        <p:txBody>
-          <a:bodyPr wrap="square" rtlCol="0">
-            <a:spAutoFit/>
-          </a:bodyPr>
-          <a:lstStyle/>
-          <a:p>
-            <a:pPr algn="r"/>
-            <a:r>
-              <a:rPr lang="en-US" sz="1400" dirty="0"/>
-              <a:t>Intercept</a:t>
             </a:r>
           </a:p>
         </p:txBody>
@@ -8991,47 +8526,6 @@
           <a:xfrm flipV="1">
             <a:off x="9502367" y="3299385"/>
             <a:ext cx="0" cy="177401"/>
-          </a:xfrm>
-          <a:prstGeom prst="straightConnector1">
-            <a:avLst/>
-          </a:prstGeom>
-          <a:ln>
-            <a:tailEnd type="triangle"/>
-          </a:ln>
-        </p:spPr>
-        <p:style>
-          <a:lnRef idx="2">
-            <a:schemeClr val="dk1"/>
-          </a:lnRef>
-          <a:fillRef idx="0">
-            <a:schemeClr val="dk1"/>
-          </a:fillRef>
-          <a:effectRef idx="1">
-            <a:schemeClr val="dk1"/>
-          </a:effectRef>
-          <a:fontRef idx="minor">
-            <a:schemeClr val="tx1"/>
-          </a:fontRef>
-        </p:style>
-      </p:cxnSp>
-      <p:cxnSp>
-        <p:nvCxnSpPr>
-          <p:cNvPr id="23" name="Straight Arrow Connector 22">
-            <a:extLst>
-              <a:ext uri="{FF2B5EF4-FFF2-40B4-BE49-F238E27FC236}">
-                <a16:creationId xmlns:a16="http://schemas.microsoft.com/office/drawing/2014/main" id="{A76397B2-1C3B-09C2-B0D2-58544F8697C0}"/>
-              </a:ext>
-            </a:extLst>
-          </p:cNvPr>
-          <p:cNvCxnSpPr>
-            <a:cxnSpLocks/>
-          </p:cNvCxnSpPr>
-          <p:nvPr/>
-        </p:nvCxnSpPr>
-        <p:spPr>
-          <a:xfrm flipV="1">
-            <a:off x="8549023" y="4740414"/>
-            <a:ext cx="815556" cy="606114"/>
           </a:xfrm>
           <a:prstGeom prst="straightConnector1">
             <a:avLst/>
@@ -10378,8 +9872,8 @@
           </p:sp>
         </mc:Fallback>
       </mc:AlternateContent>
-      <mc:AlternateContent xmlns:mc="http://schemas.openxmlformats.org/markup-compatibility/2006" xmlns:a14="http://schemas.microsoft.com/office/drawing/2010/main">
-        <mc:Choice Requires="a14">
+      <mc:AlternateContent xmlns:mc="http://schemas.openxmlformats.org/markup-compatibility/2006">
+        <mc:Choice xmlns:a14="http://schemas.microsoft.com/office/drawing/2010/main" Requires="a14">
           <p:sp>
             <p:nvSpPr>
               <p:cNvPr id="36" name="TextBox 35">
@@ -10394,7 +9888,7 @@
             </p:nvSpPr>
             <p:spPr>
               <a:xfrm>
-                <a:off x="9238054" y="4738021"/>
+                <a:off x="9227483" y="5006867"/>
                 <a:ext cx="482826" cy="381515"/>
               </a:xfrm>
               <a:prstGeom prst="rect">
@@ -10466,7 +9960,7 @@
             </p:txBody>
           </p:sp>
         </mc:Choice>
-        <mc:Fallback xmlns="">
+        <mc:Fallback>
           <p:sp>
             <p:nvSpPr>
               <p:cNvPr id="36" name="TextBox 35">
@@ -10483,7 +9977,7 @@
             </p:nvSpPr>
             <p:spPr>
               <a:xfrm>
-                <a:off x="9238054" y="4738021"/>
+                <a:off x="9227483" y="5006867"/>
                 <a:ext cx="482826" cy="381515"/>
               </a:xfrm>
               <a:prstGeom prst="rect">
@@ -10788,14 +10282,13 @@
           </p:cNvPr>
           <p:cNvCxnSpPr>
             <a:cxnSpLocks/>
-            <a:endCxn id="36" idx="0"/>
           </p:cNvCxnSpPr>
           <p:nvPr/>
         </p:nvCxnSpPr>
         <p:spPr>
           <a:xfrm flipV="1">
-            <a:off x="9284501" y="4738021"/>
-            <a:ext cx="194966" cy="629298"/>
+            <a:off x="8731207" y="4748086"/>
+            <a:ext cx="825084" cy="629876"/>
           </a:xfrm>
           <a:prstGeom prst="straightConnector1">
             <a:avLst/>
@@ -10833,14 +10326,13 @@
           </p:cNvPr>
           <p:cNvCxnSpPr>
             <a:cxnSpLocks/>
-            <a:endCxn id="44" idx="0"/>
           </p:cNvCxnSpPr>
           <p:nvPr/>
         </p:nvCxnSpPr>
         <p:spPr>
-          <a:xfrm flipH="1" flipV="1">
-            <a:off x="8822221" y="4758812"/>
-            <a:ext cx="232505" cy="558638"/>
+          <a:xfrm flipV="1">
+            <a:off x="8521753" y="4748086"/>
+            <a:ext cx="0" cy="597084"/>
           </a:xfrm>
           <a:prstGeom prst="straightConnector1">
             <a:avLst/>
@@ -10867,8 +10359,8 @@
           </a:fontRef>
         </p:style>
       </p:cxnSp>
-      <mc:AlternateContent xmlns:mc="http://schemas.openxmlformats.org/markup-compatibility/2006" xmlns:a14="http://schemas.microsoft.com/office/drawing/2010/main">
-        <mc:Choice Requires="a14">
+      <mc:AlternateContent xmlns:mc="http://schemas.openxmlformats.org/markup-compatibility/2006">
+        <mc:Choice xmlns:a14="http://schemas.microsoft.com/office/drawing/2010/main" Requires="a14">
           <p:sp>
             <p:nvSpPr>
               <p:cNvPr id="43" name="TextBox 42">
@@ -10883,7 +10375,7 @@
             </p:nvSpPr>
             <p:spPr>
               <a:xfrm>
-                <a:off x="9054726" y="5019279"/>
+                <a:off x="8704806" y="5019890"/>
                 <a:ext cx="482826" cy="381515"/>
               </a:xfrm>
               <a:prstGeom prst="rect">
@@ -10955,7 +10447,7 @@
             </p:txBody>
           </p:sp>
         </mc:Choice>
-        <mc:Fallback xmlns="">
+        <mc:Fallback>
           <p:sp>
             <p:nvSpPr>
               <p:cNvPr id="43" name="TextBox 42">
@@ -10972,7 +10464,7 @@
             </p:nvSpPr>
             <p:spPr>
               <a:xfrm>
-                <a:off x="9054726" y="5019279"/>
+                <a:off x="8704806" y="5019890"/>
                 <a:ext cx="482826" cy="381515"/>
               </a:xfrm>
               <a:prstGeom prst="rect">
@@ -11000,8 +10492,8 @@
           </p:sp>
         </mc:Fallback>
       </mc:AlternateContent>
-      <mc:AlternateContent xmlns:mc="http://schemas.openxmlformats.org/markup-compatibility/2006" xmlns:a14="http://schemas.microsoft.com/office/drawing/2010/main">
-        <mc:Choice Requires="a14">
+      <mc:AlternateContent xmlns:mc="http://schemas.openxmlformats.org/markup-compatibility/2006">
+        <mc:Choice xmlns:a14="http://schemas.microsoft.com/office/drawing/2010/main" Requires="a14">
           <p:sp>
             <p:nvSpPr>
               <p:cNvPr id="44" name="TextBox 43">
@@ -11016,7 +10508,7 @@
             </p:nvSpPr>
             <p:spPr>
               <a:xfrm>
-                <a:off x="8580808" y="4758812"/>
+                <a:off x="8066197" y="4880637"/>
                 <a:ext cx="482826" cy="381515"/>
               </a:xfrm>
               <a:prstGeom prst="rect">
@@ -11088,7 +10580,7 @@
             </p:txBody>
           </p:sp>
         </mc:Choice>
-        <mc:Fallback xmlns="">
+        <mc:Fallback>
           <p:sp>
             <p:nvSpPr>
               <p:cNvPr id="44" name="TextBox 43">
@@ -11105,7 +10597,7 @@
             </p:nvSpPr>
             <p:spPr>
               <a:xfrm>
-                <a:off x="8580808" y="4758812"/>
+                <a:off x="8066197" y="4880637"/>
                 <a:ext cx="482826" cy="381515"/>
               </a:xfrm>
               <a:prstGeom prst="rect">
@@ -11114,7 +10606,7 @@
               <a:blipFill>
                 <a:blip r:embed="rId18"/>
                 <a:stretch>
-                  <a:fillRect/>
+                  <a:fillRect r="-2632"/>
                 </a:stretch>
               </a:blipFill>
             </p:spPr>
@@ -11147,7 +10639,7 @@
         </p:nvSpPr>
         <p:spPr>
           <a:xfrm rot="18054908">
-            <a:off x="8281732" y="6458298"/>
+            <a:off x="7946630" y="6511410"/>
             <a:ext cx="1204786" cy="307777"/>
           </a:xfrm>
           <a:prstGeom prst="rect">

</xml_diff>